<commit_message>
Updated screen shot in Storage slides
</commit_message>
<xml_diff>
--- a/Content/Storage/Azure Storage.pptx
+++ b/Content/Storage/Azure Storage.pptx
@@ -12548,11 +12548,7 @@
           <a:p>
             <a:r>
               <a:rPr lang="en-US" dirty="0" smtClean="0"/>
-              <a:t>Azure Storage </a:t>
-            </a:r>
-            <a:r>
-              <a:rPr lang="en-US" dirty="0" smtClean="0"/>
-              <a:t>Explorer</a:t>
+              <a:t>Azure Storage Explorer</a:t>
             </a:r>
             <a:endParaRPr lang="en-US" dirty="0"/>
           </a:p>
@@ -13316,55 +13312,7 @@
                 <a:latin typeface="Segoe UI Light" panose="020B0502040204020203" pitchFamily="34" charset="0"/>
                 <a:cs typeface="Segoe UI Light" panose="020B0502040204020203" pitchFamily="34" charset="0"/>
               </a:rPr>
-              <a:t> type of data, analogous to files in a file system, with individual blobs storing up to </a:t>
-            </a:r>
-            <a:r>
-              <a:rPr lang="en-US" sz="2400" dirty="0" smtClean="0">
-                <a:gradFill>
-                  <a:gsLst>
-                    <a:gs pos="0">
-                      <a:srgbClr val="292929">
-                        <a:lumMod val="90000"/>
-                        <a:lumOff val="10000"/>
-                      </a:srgbClr>
-                    </a:gs>
-                    <a:gs pos="86000">
-                      <a:srgbClr val="292929">
-                        <a:lumMod val="90000"/>
-                        <a:lumOff val="10000"/>
-                      </a:srgbClr>
-                    </a:gs>
-                  </a:gsLst>
-                  <a:lin ang="5400000" scaled="0"/>
-                </a:gradFill>
-                <a:latin typeface="Segoe UI Light" panose="020B0502040204020203" pitchFamily="34" charset="0"/>
-                <a:cs typeface="Segoe UI Light" panose="020B0502040204020203" pitchFamily="34" charset="0"/>
-              </a:rPr>
-              <a:t>4.75 </a:t>
-            </a:r>
-            <a:r>
-              <a:rPr lang="en-US" sz="2400" dirty="0" smtClean="0">
-                <a:gradFill>
-                  <a:gsLst>
-                    <a:gs pos="0">
-                      <a:srgbClr val="292929">
-                        <a:lumMod val="90000"/>
-                        <a:lumOff val="10000"/>
-                      </a:srgbClr>
-                    </a:gs>
-                    <a:gs pos="86000">
-                      <a:srgbClr val="292929">
-                        <a:lumMod val="90000"/>
-                        <a:lumOff val="10000"/>
-                      </a:srgbClr>
-                    </a:gs>
-                  </a:gsLst>
-                  <a:lin ang="5400000" scaled="0"/>
-                </a:gradFill>
-                <a:latin typeface="Segoe UI Light" panose="020B0502040204020203" pitchFamily="34" charset="0"/>
-                <a:cs typeface="Segoe UI Light" panose="020B0502040204020203" pitchFamily="34" charset="0"/>
-              </a:rPr>
-              <a:t>TB of data</a:t>
+              <a:t> type of data, analogous to files in a file system, with individual blobs storing up to 4.75 TB of data</a:t>
             </a:r>
             <a:endParaRPr lang="en-US" sz="2400" dirty="0">
               <a:gradFill>
@@ -17105,7 +17053,7 @@
         <p:spPr>
           <a:xfrm>
             <a:off x="519247" y="1447800"/>
-            <a:ext cx="6677199" cy="4215385"/>
+            <a:ext cx="5608369" cy="4215385"/>
           </a:xfrm>
         </p:spPr>
         <p:txBody>
@@ -17123,16 +17071,13 @@
             <a:endParaRPr lang="en-US" dirty="0"/>
           </a:p>
           <a:p>
-            <a:pPr lvl="1"/>
+            <a:r>
+              <a:rPr lang="en-US" dirty="0" smtClean="0"/>
+              <a:t>Keys </a:t>
+            </a:r>
             <a:r>
               <a:rPr lang="en-US" dirty="0"/>
-              <a:t>Two 512-bit keys per account</a:t>
-            </a:r>
-          </a:p>
-          <a:p>
-            <a:r>
-              <a:rPr lang="en-US" dirty="0"/>
-              <a:t>Keys should be "rolled" periodically for security</a:t>
+              <a:t>should be "rolled" periodically for security</a:t>
             </a:r>
           </a:p>
           <a:p>
@@ -17150,7 +17095,7 @@
       </p:sp>
       <p:pic>
         <p:nvPicPr>
-          <p:cNvPr id="5" name="Picture 4"/>
+          <p:cNvPr id="4" name="Picture 3"/>
           <p:cNvPicPr>
             <a:picLocks noChangeAspect="1"/>
           </p:cNvPicPr>
@@ -17164,8 +17109,8 @@
         </p:blipFill>
         <p:spPr>
           <a:xfrm>
-            <a:off x="7923316" y="1447800"/>
-            <a:ext cx="3310742" cy="4138428"/>
+            <a:off x="6127616" y="1590983"/>
+            <a:ext cx="5543550" cy="3438525"/>
           </a:xfrm>
           <a:prstGeom prst="rect">
             <a:avLst/>
@@ -18027,23 +17972,7 @@
                   <a:schemeClr val="bg1"/>
                 </a:solidFill>
               </a:rPr>
-              <a:t>Up to </a:t>
-            </a:r>
-            <a:r>
-              <a:rPr lang="en-US" sz="2000" dirty="0" smtClean="0">
-                <a:solidFill>
-                  <a:schemeClr val="bg1"/>
-                </a:solidFill>
-              </a:rPr>
-              <a:t>4.75</a:t>
-            </a:r>
-            <a:r>
-              <a:rPr lang="en-US" sz="2000" dirty="0" smtClean="0">
-                <a:solidFill>
-                  <a:schemeClr val="bg1"/>
-                </a:solidFill>
-              </a:rPr>
-              <a:t> </a:t>
+              <a:t>Up to 4.75 </a:t>
             </a:r>
             <a:r>
               <a:rPr lang="en-US" sz="2000" dirty="0">
@@ -18061,11 +17990,6 @@
               </a:rPr>
               <a:t>B</a:t>
             </a:r>
-            <a:endParaRPr lang="en-US" sz="2000" dirty="0" smtClean="0">
-              <a:solidFill>
-                <a:schemeClr val="bg1"/>
-              </a:solidFill>
-            </a:endParaRPr>
           </a:p>
           <a:p>
             <a:pPr algn="ctr"/>

</xml_diff>